<commit_message>
DS COmplete PYQ Topic wise
</commit_message>
<xml_diff>
--- a/GATE/DBMS ✅/CH 04 File organization and Indexing/Clarity.pptx
+++ b/GATE/DBMS ✅/CH 04 File organization and Indexing/Clarity.pptx
@@ -292,7 +292,7 @@
           <a:p>
             <a:fld id="{03FE94D9-FF06-4148-B9E4-98425E293281}" type="datetimeFigureOut">
               <a:rPr lang="en-IN" smtClean="0"/>
-              <a:t>31-12-2025</a:t>
+              <a:t>01-02-2026</a:t>
             </a:fld>
             <a:endParaRPr lang="en-IN"/>
           </a:p>
@@ -492,7 +492,7 @@
           <a:p>
             <a:fld id="{03FE94D9-FF06-4148-B9E4-98425E293281}" type="datetimeFigureOut">
               <a:rPr lang="en-IN" smtClean="0"/>
-              <a:t>31-12-2025</a:t>
+              <a:t>01-02-2026</a:t>
             </a:fld>
             <a:endParaRPr lang="en-IN"/>
           </a:p>
@@ -702,7 +702,7 @@
           <a:p>
             <a:fld id="{03FE94D9-FF06-4148-B9E4-98425E293281}" type="datetimeFigureOut">
               <a:rPr lang="en-IN" smtClean="0"/>
-              <a:t>31-12-2025</a:t>
+              <a:t>01-02-2026</a:t>
             </a:fld>
             <a:endParaRPr lang="en-IN"/>
           </a:p>
@@ -902,7 +902,7 @@
           <a:p>
             <a:fld id="{03FE94D9-FF06-4148-B9E4-98425E293281}" type="datetimeFigureOut">
               <a:rPr lang="en-IN" smtClean="0"/>
-              <a:t>31-12-2025</a:t>
+              <a:t>01-02-2026</a:t>
             </a:fld>
             <a:endParaRPr lang="en-IN"/>
           </a:p>
@@ -1178,7 +1178,7 @@
           <a:p>
             <a:fld id="{03FE94D9-FF06-4148-B9E4-98425E293281}" type="datetimeFigureOut">
               <a:rPr lang="en-IN" smtClean="0"/>
-              <a:t>31-12-2025</a:t>
+              <a:t>01-02-2026</a:t>
             </a:fld>
             <a:endParaRPr lang="en-IN"/>
           </a:p>
@@ -1446,7 +1446,7 @@
           <a:p>
             <a:fld id="{03FE94D9-FF06-4148-B9E4-98425E293281}" type="datetimeFigureOut">
               <a:rPr lang="en-IN" smtClean="0"/>
-              <a:t>31-12-2025</a:t>
+              <a:t>01-02-2026</a:t>
             </a:fld>
             <a:endParaRPr lang="en-IN"/>
           </a:p>
@@ -1861,7 +1861,7 @@
           <a:p>
             <a:fld id="{03FE94D9-FF06-4148-B9E4-98425E293281}" type="datetimeFigureOut">
               <a:rPr lang="en-IN" smtClean="0"/>
-              <a:t>31-12-2025</a:t>
+              <a:t>01-02-2026</a:t>
             </a:fld>
             <a:endParaRPr lang="en-IN"/>
           </a:p>
@@ -2003,7 +2003,7 @@
           <a:p>
             <a:fld id="{03FE94D9-FF06-4148-B9E4-98425E293281}" type="datetimeFigureOut">
               <a:rPr lang="en-IN" smtClean="0"/>
-              <a:t>31-12-2025</a:t>
+              <a:t>01-02-2026</a:t>
             </a:fld>
             <a:endParaRPr lang="en-IN"/>
           </a:p>
@@ -2116,7 +2116,7 @@
           <a:p>
             <a:fld id="{03FE94D9-FF06-4148-B9E4-98425E293281}" type="datetimeFigureOut">
               <a:rPr lang="en-IN" smtClean="0"/>
-              <a:t>31-12-2025</a:t>
+              <a:t>01-02-2026</a:t>
             </a:fld>
             <a:endParaRPr lang="en-IN"/>
           </a:p>
@@ -2429,7 +2429,7 @@
           <a:p>
             <a:fld id="{03FE94D9-FF06-4148-B9E4-98425E293281}" type="datetimeFigureOut">
               <a:rPr lang="en-IN" smtClean="0"/>
-              <a:t>31-12-2025</a:t>
+              <a:t>01-02-2026</a:t>
             </a:fld>
             <a:endParaRPr lang="en-IN"/>
           </a:p>
@@ -2718,7 +2718,7 @@
           <a:p>
             <a:fld id="{03FE94D9-FF06-4148-B9E4-98425E293281}" type="datetimeFigureOut">
               <a:rPr lang="en-IN" smtClean="0"/>
-              <a:t>31-12-2025</a:t>
+              <a:t>01-02-2026</a:t>
             </a:fld>
             <a:endParaRPr lang="en-IN"/>
           </a:p>
@@ -2961,7 +2961,7 @@
           <a:p>
             <a:fld id="{03FE94D9-FF06-4148-B9E4-98425E293281}" type="datetimeFigureOut">
               <a:rPr lang="en-IN" smtClean="0"/>
-              <a:t>31-12-2025</a:t>
+              <a:t>01-02-2026</a:t>
             </a:fld>
             <a:endParaRPr lang="en-IN"/>
           </a:p>
@@ -3407,31 +3407,6 @@
               </a:rPr>
               <a:t>Clarity</a:t>
             </a:r>
-          </a:p>
-        </p:txBody>
-      </p:sp>
-      <p:sp>
-        <p:nvSpPr>
-          <p:cNvPr id="3" name="Subtitle 2">
-            <a:extLst>
-              <a:ext uri="{FF2B5EF4-FFF2-40B4-BE49-F238E27FC236}">
-                <a16:creationId xmlns:a16="http://schemas.microsoft.com/office/drawing/2014/main" id="{9DC002EB-AF1C-4ED1-836D-174896C003C0}"/>
-              </a:ext>
-            </a:extLst>
-          </p:cNvPr>
-          <p:cNvSpPr>
-            <a:spLocks noGrp="1"/>
-          </p:cNvSpPr>
-          <p:nvPr>
-            <p:ph type="subTitle" idx="1"/>
-          </p:nvPr>
-        </p:nvSpPr>
-        <p:spPr/>
-        <p:txBody>
-          <a:bodyPr/>
-          <a:lstStyle/>
-          <a:p>
-            <a:endParaRPr lang="en-IN"/>
           </a:p>
         </p:txBody>
       </p:sp>

</xml_diff>